<commit_message>
serveral playback/looping/beatjumping bug fixes
</commit_message>
<xml_diff>
--- a/Design Log/DJ deck.pptx
+++ b/Design Log/DJ deck.pptx
@@ -5,7 +5,7 @@
     <p:sldMasterId id="2147483648" r:id="rId1"/>
   </p:sldMasterIdLst>
   <p:notesMasterIdLst>
-    <p:notesMasterId r:id="rId27"/>
+    <p:notesMasterId r:id="rId28"/>
   </p:notesMasterIdLst>
   <p:sldIdLst>
     <p:sldId id="256" r:id="rId2"/>
@@ -33,6 +33,7 @@
     <p:sldId id="278" r:id="rId24"/>
     <p:sldId id="279" r:id="rId25"/>
     <p:sldId id="280" r:id="rId26"/>
+    <p:sldId id="281" r:id="rId27"/>
   </p:sldIdLst>
   <p:sldSz cx="12192000" cy="6858000"/>
   <p:notesSz cx="6858000" cy="9144000"/>
@@ -221,7 +222,7 @@
           <a:p>
             <a:fld id="{F2131A79-E1C2-43E2-88BB-991A587CF34B}" type="datetimeFigureOut">
               <a:rPr lang="nl-NL" smtClean="0"/>
-              <a:t>22-4-2025</a:t>
+              <a:t>6-5-2025</a:t>
             </a:fld>
             <a:endParaRPr lang="nl-NL"/>
           </a:p>
@@ -722,7 +723,7 @@
           <a:p>
             <a:fld id="{291A462F-E04C-4E22-938A-A0EF93E33BE5}" type="datetimeFigureOut">
               <a:rPr lang="nl-NL" smtClean="0"/>
-              <a:t>22-4-2025</a:t>
+              <a:t>6-5-2025</a:t>
             </a:fld>
             <a:endParaRPr lang="nl-NL"/>
           </a:p>
@@ -922,7 +923,7 @@
           <a:p>
             <a:fld id="{291A462F-E04C-4E22-938A-A0EF93E33BE5}" type="datetimeFigureOut">
               <a:rPr lang="nl-NL" smtClean="0"/>
-              <a:t>22-4-2025</a:t>
+              <a:t>6-5-2025</a:t>
             </a:fld>
             <a:endParaRPr lang="nl-NL"/>
           </a:p>
@@ -1132,7 +1133,7 @@
           <a:p>
             <a:fld id="{291A462F-E04C-4E22-938A-A0EF93E33BE5}" type="datetimeFigureOut">
               <a:rPr lang="nl-NL" smtClean="0"/>
-              <a:t>22-4-2025</a:t>
+              <a:t>6-5-2025</a:t>
             </a:fld>
             <a:endParaRPr lang="nl-NL"/>
           </a:p>
@@ -1332,7 +1333,7 @@
           <a:p>
             <a:fld id="{291A462F-E04C-4E22-938A-A0EF93E33BE5}" type="datetimeFigureOut">
               <a:rPr lang="nl-NL" smtClean="0"/>
-              <a:t>22-4-2025</a:t>
+              <a:t>6-5-2025</a:t>
             </a:fld>
             <a:endParaRPr lang="nl-NL"/>
           </a:p>
@@ -1608,7 +1609,7 @@
           <a:p>
             <a:fld id="{291A462F-E04C-4E22-938A-A0EF93E33BE5}" type="datetimeFigureOut">
               <a:rPr lang="nl-NL" smtClean="0"/>
-              <a:t>22-4-2025</a:t>
+              <a:t>6-5-2025</a:t>
             </a:fld>
             <a:endParaRPr lang="nl-NL"/>
           </a:p>
@@ -1876,7 +1877,7 @@
           <a:p>
             <a:fld id="{291A462F-E04C-4E22-938A-A0EF93E33BE5}" type="datetimeFigureOut">
               <a:rPr lang="nl-NL" smtClean="0"/>
-              <a:t>22-4-2025</a:t>
+              <a:t>6-5-2025</a:t>
             </a:fld>
             <a:endParaRPr lang="nl-NL"/>
           </a:p>
@@ -2291,7 +2292,7 @@
           <a:p>
             <a:fld id="{291A462F-E04C-4E22-938A-A0EF93E33BE5}" type="datetimeFigureOut">
               <a:rPr lang="nl-NL" smtClean="0"/>
-              <a:t>22-4-2025</a:t>
+              <a:t>6-5-2025</a:t>
             </a:fld>
             <a:endParaRPr lang="nl-NL"/>
           </a:p>
@@ -2433,7 +2434,7 @@
           <a:p>
             <a:fld id="{291A462F-E04C-4E22-938A-A0EF93E33BE5}" type="datetimeFigureOut">
               <a:rPr lang="nl-NL" smtClean="0"/>
-              <a:t>22-4-2025</a:t>
+              <a:t>6-5-2025</a:t>
             </a:fld>
             <a:endParaRPr lang="nl-NL"/>
           </a:p>
@@ -2546,7 +2547,7 @@
           <a:p>
             <a:fld id="{291A462F-E04C-4E22-938A-A0EF93E33BE5}" type="datetimeFigureOut">
               <a:rPr lang="nl-NL" smtClean="0"/>
-              <a:t>22-4-2025</a:t>
+              <a:t>6-5-2025</a:t>
             </a:fld>
             <a:endParaRPr lang="nl-NL"/>
           </a:p>
@@ -2859,7 +2860,7 @@
           <a:p>
             <a:fld id="{291A462F-E04C-4E22-938A-A0EF93E33BE5}" type="datetimeFigureOut">
               <a:rPr lang="nl-NL" smtClean="0"/>
-              <a:t>22-4-2025</a:t>
+              <a:t>6-5-2025</a:t>
             </a:fld>
             <a:endParaRPr lang="nl-NL"/>
           </a:p>
@@ -3148,7 +3149,7 @@
           <a:p>
             <a:fld id="{291A462F-E04C-4E22-938A-A0EF93E33BE5}" type="datetimeFigureOut">
               <a:rPr lang="nl-NL" smtClean="0"/>
-              <a:t>22-4-2025</a:t>
+              <a:t>6-5-2025</a:t>
             </a:fld>
             <a:endParaRPr lang="nl-NL"/>
           </a:p>
@@ -3391,7 +3392,7 @@
           <a:p>
             <a:fld id="{291A462F-E04C-4E22-938A-A0EF93E33BE5}" type="datetimeFigureOut">
               <a:rPr lang="nl-NL" smtClean="0"/>
-              <a:t>22-4-2025</a:t>
+              <a:t>6-5-2025</a:t>
             </a:fld>
             <a:endParaRPr lang="nl-NL"/>
           </a:p>
@@ -12599,6 +12600,278 @@
     <p:extLst>
       <p:ext uri="{BB962C8B-B14F-4D97-AF65-F5344CB8AC3E}">
         <p14:creationId xmlns:p14="http://schemas.microsoft.com/office/powerpoint/2010/main" val="593431484"/>
+      </p:ext>
+    </p:extLst>
+  </p:cSld>
+  <p:clrMapOvr>
+    <a:masterClrMapping/>
+  </p:clrMapOvr>
+</p:sld>
+</file>
+
+<file path=ppt/slides/slide26.xml><?xml version="1.0" encoding="utf-8"?>
+<p:sld xmlns:a="http://schemas.openxmlformats.org/drawingml/2006/main" xmlns:r="http://schemas.openxmlformats.org/officeDocument/2006/relationships" xmlns:p="http://schemas.openxmlformats.org/presentationml/2006/main">
+  <p:cSld>
+    <p:spTree>
+      <p:nvGrpSpPr>
+        <p:cNvPr id="1" name=""/>
+        <p:cNvGrpSpPr/>
+        <p:nvPr/>
+      </p:nvGrpSpPr>
+      <p:grpSpPr>
+        <a:xfrm>
+          <a:off x="0" y="0"/>
+          <a:ext cx="0" cy="0"/>
+          <a:chOff x="0" y="0"/>
+          <a:chExt cx="0" cy="0"/>
+        </a:xfrm>
+      </p:grpSpPr>
+      <p:sp>
+        <p:nvSpPr>
+          <p:cNvPr id="2" name="Title 1">
+            <a:extLst>
+              <a:ext uri="{FF2B5EF4-FFF2-40B4-BE49-F238E27FC236}">
+                <a16:creationId xmlns:a16="http://schemas.microsoft.com/office/drawing/2014/main" id="{ED0BF306-C6AD-636B-590F-6F4799778F39}"/>
+              </a:ext>
+            </a:extLst>
+          </p:cNvPr>
+          <p:cNvSpPr>
+            <a:spLocks noGrp="1"/>
+          </p:cNvSpPr>
+          <p:nvPr>
+            <p:ph type="title"/>
+          </p:nvPr>
+        </p:nvSpPr>
+        <p:spPr/>
+        <p:txBody>
+          <a:bodyPr/>
+          <a:lstStyle/>
+          <a:p>
+            <a:r>
+              <a:rPr lang="nl-NL" dirty="0"/>
+              <a:t>Looping</a:t>
+            </a:r>
+          </a:p>
+        </p:txBody>
+      </p:sp>
+      <p:sp>
+        <p:nvSpPr>
+          <p:cNvPr id="3" name="Content Placeholder 2">
+            <a:extLst>
+              <a:ext uri="{FF2B5EF4-FFF2-40B4-BE49-F238E27FC236}">
+                <a16:creationId xmlns:a16="http://schemas.microsoft.com/office/drawing/2014/main" id="{61E8547B-9E51-213E-5F89-A97068E46779}"/>
+              </a:ext>
+            </a:extLst>
+          </p:cNvPr>
+          <p:cNvSpPr>
+            <a:spLocks noGrp="1"/>
+          </p:cNvSpPr>
+          <p:nvPr>
+            <p:ph idx="1"/>
+          </p:nvPr>
+        </p:nvSpPr>
+        <p:spPr>
+          <a:xfrm>
+            <a:off x="838200" y="1825625"/>
+            <a:ext cx="10015728" cy="4351338"/>
+          </a:xfrm>
+        </p:spPr>
+        <p:txBody>
+          <a:bodyPr/>
+          <a:lstStyle/>
+          <a:p>
+            <a:r>
+              <a:rPr lang="nl-NL" dirty="0"/>
+              <a:t>I </a:t>
+            </a:r>
+            <a:r>
+              <a:rPr lang="nl-NL" dirty="0" err="1"/>
+              <a:t>should</a:t>
+            </a:r>
+            <a:r>
+              <a:rPr lang="nl-NL" dirty="0"/>
+              <a:t> </a:t>
+            </a:r>
+            <a:r>
+              <a:rPr lang="nl-NL" dirty="0" err="1"/>
+              <a:t>distinguish</a:t>
+            </a:r>
+            <a:r>
+              <a:rPr lang="nl-NL" dirty="0"/>
+              <a:t> </a:t>
+            </a:r>
+            <a:r>
+              <a:rPr lang="nl-NL" dirty="0" err="1"/>
+              <a:t>between</a:t>
+            </a:r>
+            <a:r>
+              <a:rPr lang="nl-NL" dirty="0"/>
+              <a:t> </a:t>
+            </a:r>
+            <a:r>
+              <a:rPr lang="nl-NL" dirty="0" err="1"/>
+              <a:t>two</a:t>
+            </a:r>
+            <a:r>
+              <a:rPr lang="nl-NL" dirty="0"/>
+              <a:t> looping modes</a:t>
+            </a:r>
+          </a:p>
+          <a:p>
+            <a:pPr lvl="1"/>
+            <a:r>
+              <a:rPr lang="nl-NL" dirty="0"/>
+              <a:t>Front (</a:t>
+            </a:r>
+            <a:r>
+              <a:rPr lang="nl-NL" dirty="0" err="1"/>
+              <a:t>normal</a:t>
+            </a:r>
+            <a:r>
+              <a:rPr lang="nl-NL" dirty="0"/>
+              <a:t>), start point of loop is </a:t>
+            </a:r>
+            <a:r>
+              <a:rPr lang="nl-NL" dirty="0" err="1"/>
+              <a:t>fixed</a:t>
+            </a:r>
+            <a:r>
+              <a:rPr lang="nl-NL" dirty="0"/>
+              <a:t>, </a:t>
+            </a:r>
+            <a:r>
+              <a:rPr lang="nl-NL" dirty="0" err="1"/>
+              <a:t>length</a:t>
+            </a:r>
+            <a:r>
+              <a:rPr lang="nl-NL" dirty="0"/>
+              <a:t> </a:t>
+            </a:r>
+            <a:r>
+              <a:rPr lang="nl-NL" dirty="0" err="1"/>
+              <a:t>modulates</a:t>
+            </a:r>
+            <a:r>
+              <a:rPr lang="nl-NL" dirty="0"/>
+              <a:t> </a:t>
+            </a:r>
+            <a:r>
+              <a:rPr lang="nl-NL" dirty="0" err="1"/>
+              <a:t>the</a:t>
+            </a:r>
+            <a:r>
+              <a:rPr lang="nl-NL" dirty="0"/>
+              <a:t> end point -&gt; </a:t>
+            </a:r>
+            <a:r>
+              <a:rPr lang="nl-NL" dirty="0" err="1"/>
+              <a:t>currently</a:t>
+            </a:r>
+            <a:r>
+              <a:rPr lang="nl-NL" dirty="0"/>
+              <a:t> </a:t>
+            </a:r>
+            <a:r>
+              <a:rPr lang="nl-NL"/>
+              <a:t>implemented</a:t>
+            </a:r>
+            <a:endParaRPr lang="nl-NL" dirty="0"/>
+          </a:p>
+          <a:p>
+            <a:pPr lvl="1"/>
+            <a:r>
+              <a:rPr lang="nl-NL" dirty="0"/>
+              <a:t>End, end point of loop is </a:t>
+            </a:r>
+            <a:r>
+              <a:rPr lang="nl-NL" dirty="0" err="1"/>
+              <a:t>fixed</a:t>
+            </a:r>
+            <a:r>
+              <a:rPr lang="nl-NL" dirty="0"/>
+              <a:t>, </a:t>
+            </a:r>
+            <a:r>
+              <a:rPr lang="nl-NL" dirty="0" err="1"/>
+              <a:t>length</a:t>
+            </a:r>
+            <a:r>
+              <a:rPr lang="nl-NL" dirty="0"/>
+              <a:t> </a:t>
+            </a:r>
+            <a:r>
+              <a:rPr lang="nl-NL" dirty="0" err="1"/>
+              <a:t>modulates</a:t>
+            </a:r>
+            <a:r>
+              <a:rPr lang="nl-NL" dirty="0"/>
+              <a:t> </a:t>
+            </a:r>
+            <a:r>
+              <a:rPr lang="nl-NL" dirty="0" err="1"/>
+              <a:t>the</a:t>
+            </a:r>
+            <a:r>
+              <a:rPr lang="nl-NL" dirty="0"/>
+              <a:t> start point</a:t>
+            </a:r>
+          </a:p>
+        </p:txBody>
+      </p:sp>
+      <p:sp>
+        <p:nvSpPr>
+          <p:cNvPr id="4" name="Rectangle: Rounded Corners 3">
+            <a:extLst>
+              <a:ext uri="{FF2B5EF4-FFF2-40B4-BE49-F238E27FC236}">
+                <a16:creationId xmlns:a16="http://schemas.microsoft.com/office/drawing/2014/main" id="{3E0030C7-8F1D-24A9-29F2-3DE0B059D3CE}"/>
+              </a:ext>
+            </a:extLst>
+          </p:cNvPr>
+          <p:cNvSpPr/>
+          <p:nvPr/>
+        </p:nvSpPr>
+        <p:spPr>
+          <a:xfrm>
+            <a:off x="10853928" y="2166176"/>
+            <a:ext cx="1170432" cy="979043"/>
+          </a:xfrm>
+          <a:prstGeom prst="roundRect">
+            <a:avLst/>
+          </a:prstGeom>
+        </p:spPr>
+        <p:style>
+          <a:lnRef idx="2">
+            <a:schemeClr val="accent2">
+              <a:shade val="15000"/>
+            </a:schemeClr>
+          </a:lnRef>
+          <a:fillRef idx="1">
+            <a:schemeClr val="accent2"/>
+          </a:fillRef>
+          <a:effectRef idx="0">
+            <a:schemeClr val="accent2"/>
+          </a:effectRef>
+          <a:fontRef idx="minor">
+            <a:schemeClr val="lt1"/>
+          </a:fontRef>
+        </p:style>
+        <p:txBody>
+          <a:bodyPr rtlCol="0" anchor="ctr"/>
+          <a:lstStyle/>
+          <a:p>
+            <a:pPr algn="ctr"/>
+            <a:r>
+              <a:rPr lang="nl-NL" sz="4400" dirty="0"/>
+              <a:t>AP</a:t>
+            </a:r>
+            <a:endParaRPr lang="nl-NL" dirty="0"/>
+          </a:p>
+        </p:txBody>
+      </p:sp>
+    </p:spTree>
+    <p:extLst>
+      <p:ext uri="{BB962C8B-B14F-4D97-AF65-F5344CB8AC3E}">
+        <p14:creationId xmlns:p14="http://schemas.microsoft.com/office/powerpoint/2010/main" val="321030020"/>
       </p:ext>
     </p:extLst>
   </p:cSld>

</xml_diff>